<commit_message>
Implement convention-based naming system for PowerPoint templates
- Add robust NamingConvention class with multi-tier detection system
- Integrate --use-conventions flag with enhance CLI command
- Successfully tested with default template (150 placeholders across 19 layouts)
- Generate semantic names: title_top_1, content_col1_1, date_footer_1, etc.
- Fix import error handling for direct script execution
- Achieve consistent naming across all template layouts

🤖 Generated with [Claude Code](https://claude.ai/code)

Co-Authored-By: Claude <noreply@anthropic.com>
</commit_message>
<xml_diff>
--- a/assets/templates/default.g.pptx
+++ b/assets/templates/default.g.pptx
@@ -131,7 +131,7 @@
       </p:grpSpPr>
       <p:sp>
         <p:nvSpPr>
-          <p:cNvPr id="2" name="Title 1">
+          <p:cNvPr id="2" name="title_top_1">
             <a:extLst>
               <a:ext uri="{FF2B5EF4-FFF2-40B4-BE49-F238E27FC236}">
                 <a16:creationId xmlns:a16="http://schemas.microsoft.com/office/drawing/2014/main" id="{D9CE86E6-C782-BA2C-142C-EA8961D1A39E}"/>
@@ -168,7 +168,7 @@
       </p:sp>
       <p:sp>
         <p:nvSpPr>
-          <p:cNvPr id="3" name="Subtitle 2">
+          <p:cNvPr id="3" name="subtitle_1">
             <a:extLst>
               <a:ext uri="{FF2B5EF4-FFF2-40B4-BE49-F238E27FC236}">
                 <a16:creationId xmlns:a16="http://schemas.microsoft.com/office/drawing/2014/main" id="{1F1E1204-8281-8730-94F6-02E56F6A3AD2}"/>
@@ -238,7 +238,7 @@
       </p:sp>
       <p:sp>
         <p:nvSpPr>
-          <p:cNvPr id="4" name="Date Placeholder 3">
+          <p:cNvPr id="4" name="date_footer_1">
             <a:extLst>
               <a:ext uri="{FF2B5EF4-FFF2-40B4-BE49-F238E27FC236}">
                 <a16:creationId xmlns:a16="http://schemas.microsoft.com/office/drawing/2014/main" id="{74987493-71B7-952F-137D-CD94C357B137}"/>
@@ -267,7 +267,7 @@
       </p:sp>
       <p:sp>
         <p:nvSpPr>
-          <p:cNvPr id="5" name="Footer Placeholder 4">
+          <p:cNvPr id="5" name="footer_footer_1">
             <a:extLst>
               <a:ext uri="{FF2B5EF4-FFF2-40B4-BE49-F238E27FC236}">
                 <a16:creationId xmlns:a16="http://schemas.microsoft.com/office/drawing/2014/main" id="{37DAC790-71C1-FA16-F2D9-3F6A6980837D}"/>
@@ -292,7 +292,7 @@
       </p:sp>
       <p:sp>
         <p:nvSpPr>
-          <p:cNvPr id="6" name="Slide Number Placeholder 5">
+          <p:cNvPr id="6" name="slide_number_footer_1">
             <a:extLst>
               <a:ext uri="{FF2B5EF4-FFF2-40B4-BE49-F238E27FC236}">
                 <a16:creationId xmlns:a16="http://schemas.microsoft.com/office/drawing/2014/main" id="{6A0BE762-E5B9-CAFA-9E55-F32EEA792A26}"/>
@@ -367,7 +367,7 @@
       </p:grpSpPr>
       <p:sp>
         <p:nvSpPr>
-          <p:cNvPr id="2" name="Title 1">
+          <p:cNvPr id="2" name="title_top_1">
             <a:extLst>
               <a:ext uri="{FF2B5EF4-FFF2-40B4-BE49-F238E27FC236}">
                 <a16:creationId xmlns:a16="http://schemas.microsoft.com/office/drawing/2014/main" id="{9DF92BB2-90A0-1A3E-F4E8-D3E2E3107435}"/>
@@ -395,7 +395,7 @@
       </p:sp>
       <p:sp>
         <p:nvSpPr>
-          <p:cNvPr id="3" name="Vertical Text Placeholder 2">
+          <p:cNvPr id="3" name="content_1">
             <a:extLst>
               <a:ext uri="{FF2B5EF4-FFF2-40B4-BE49-F238E27FC236}">
                 <a16:creationId xmlns:a16="http://schemas.microsoft.com/office/drawing/2014/main" id="{0221042B-15B3-A933-BBDD-D8C661BB6417}"/>
@@ -452,7 +452,7 @@
       </p:sp>
       <p:sp>
         <p:nvSpPr>
-          <p:cNvPr id="4" name="Date Placeholder 3">
+          <p:cNvPr id="4" name="date_footer_1">
             <a:extLst>
               <a:ext uri="{FF2B5EF4-FFF2-40B4-BE49-F238E27FC236}">
                 <a16:creationId xmlns:a16="http://schemas.microsoft.com/office/drawing/2014/main" id="{E88C8734-F937-9769-F315-D3DA12C508E8}"/>
@@ -481,7 +481,7 @@
       </p:sp>
       <p:sp>
         <p:nvSpPr>
-          <p:cNvPr id="5" name="Footer Placeholder 4">
+          <p:cNvPr id="5" name="footer_footer_1">
             <a:extLst>
               <a:ext uri="{FF2B5EF4-FFF2-40B4-BE49-F238E27FC236}">
                 <a16:creationId xmlns:a16="http://schemas.microsoft.com/office/drawing/2014/main" id="{BC7880A5-BD1A-FCB5-0B24-646DADD02B36}"/>
@@ -506,7 +506,7 @@
       </p:sp>
       <p:sp>
         <p:nvSpPr>
-          <p:cNvPr id="6" name="Slide Number Placeholder 5">
+          <p:cNvPr id="6" name="slide_number_footer_1">
             <a:extLst>
               <a:ext uri="{FF2B5EF4-FFF2-40B4-BE49-F238E27FC236}">
                 <a16:creationId xmlns:a16="http://schemas.microsoft.com/office/drawing/2014/main" id="{99AF9F98-B4EA-4BB4-C40E-99D2388125A5}"/>
@@ -565,7 +565,7 @@
       </p:grpSpPr>
       <p:sp>
         <p:nvSpPr>
-          <p:cNvPr id="2" name="Vertical Title 1">
+          <p:cNvPr id="2" name="title_top_1">
             <a:extLst>
               <a:ext uri="{FF2B5EF4-FFF2-40B4-BE49-F238E27FC236}">
                 <a16:creationId xmlns:a16="http://schemas.microsoft.com/office/drawing/2014/main" id="{649F9082-7301-2126-CFB8-D1C7E9551F34}"/>
@@ -598,7 +598,7 @@
       </p:sp>
       <p:sp>
         <p:nvSpPr>
-          <p:cNvPr id="3" name="Vertical Text Placeholder 2">
+          <p:cNvPr id="3" name="content_1">
             <a:extLst>
               <a:ext uri="{FF2B5EF4-FFF2-40B4-BE49-F238E27FC236}">
                 <a16:creationId xmlns:a16="http://schemas.microsoft.com/office/drawing/2014/main" id="{8F4FB9DE-2E90-FF48-B12F-E0CD014BFD9F}"/>
@@ -660,7 +660,7 @@
       </p:sp>
       <p:sp>
         <p:nvSpPr>
-          <p:cNvPr id="4" name="Date Placeholder 3">
+          <p:cNvPr id="4" name="date_footer_1">
             <a:extLst>
               <a:ext uri="{FF2B5EF4-FFF2-40B4-BE49-F238E27FC236}">
                 <a16:creationId xmlns:a16="http://schemas.microsoft.com/office/drawing/2014/main" id="{89DB3773-94E4-C353-BCA3-64EC3587056D}"/>
@@ -689,7 +689,7 @@
       </p:sp>
       <p:sp>
         <p:nvSpPr>
-          <p:cNvPr id="5" name="Footer Placeholder 4">
+          <p:cNvPr id="5" name="footer_footer_1">
             <a:extLst>
               <a:ext uri="{FF2B5EF4-FFF2-40B4-BE49-F238E27FC236}">
                 <a16:creationId xmlns:a16="http://schemas.microsoft.com/office/drawing/2014/main" id="{961B8EB8-F9E3-AFCA-4125-47A59660CC35}"/>
@@ -714,7 +714,7 @@
       </p:sp>
       <p:sp>
         <p:nvSpPr>
-          <p:cNvPr id="6" name="Slide Number Placeholder 5">
+          <p:cNvPr id="6" name="slide_number_footer_1">
             <a:extLst>
               <a:ext uri="{FF2B5EF4-FFF2-40B4-BE49-F238E27FC236}">
                 <a16:creationId xmlns:a16="http://schemas.microsoft.com/office/drawing/2014/main" id="{40EEFED1-1702-3FE1-FF04-FC05CBEBA5E0}"/>
@@ -773,7 +773,7 @@
       </p:grpSpPr>
       <p:sp>
         <p:nvSpPr>
-          <p:cNvPr id="2" name="Title 1">
+          <p:cNvPr id="2" name="title_top_1">
             <a:extLst>
               <a:ext uri="{FF2B5EF4-FFF2-40B4-BE49-F238E27FC236}">
                 <a16:creationId xmlns:a16="http://schemas.microsoft.com/office/drawing/2014/main" id="{2EE8977F-7A7D-ED41-7370-2E2BFBEDFFBB}"/>
@@ -801,7 +801,7 @@
       </p:sp>
       <p:sp>
         <p:nvSpPr>
-          <p:cNvPr id="15" name="Col 1 Title Placeholder 2">
+          <p:cNvPr id="15" name="title_col1_1">
             <a:extLst>
               <a:ext uri="{FF2B5EF4-FFF2-40B4-BE49-F238E27FC236}">
                 <a16:creationId xmlns:a16="http://schemas.microsoft.com/office/drawing/2014/main" id="{C5582F3A-D943-D22B-50C2-39C5D4F802ED}"/>
@@ -839,7 +839,7 @@
       </p:sp>
       <p:sp>
         <p:nvSpPr>
-          <p:cNvPr id="16" name="Col 1 Text Placeholder 3">
+          <p:cNvPr id="16" name="content_col1_1">
             <a:extLst>
               <a:ext uri="{FF2B5EF4-FFF2-40B4-BE49-F238E27FC236}">
                 <a16:creationId xmlns:a16="http://schemas.microsoft.com/office/drawing/2014/main" id="{9A8DBF07-BA14-1071-232B-F98DD4E14219}"/>
@@ -877,7 +877,7 @@
       </p:sp>
       <p:sp>
         <p:nvSpPr>
-          <p:cNvPr id="17" name="Col 2 Title Placeholder 4">
+          <p:cNvPr id="17" name="title_col2_1">
             <a:extLst>
               <a:ext uri="{FF2B5EF4-FFF2-40B4-BE49-F238E27FC236}">
                 <a16:creationId xmlns:a16="http://schemas.microsoft.com/office/drawing/2014/main" id="{C68EEECF-A9A2-01FF-29D1-8860960C11F2}"/>
@@ -915,7 +915,7 @@
       </p:sp>
       <p:sp>
         <p:nvSpPr>
-          <p:cNvPr id="18" name="Col 2 Text Placeholder 5">
+          <p:cNvPr id="18" name="content_col2_1">
             <a:extLst>
               <a:ext uri="{FF2B5EF4-FFF2-40B4-BE49-F238E27FC236}">
                 <a16:creationId xmlns:a16="http://schemas.microsoft.com/office/drawing/2014/main" id="{3243E739-7F7F-7D90-BE91-2AD0ED2AACF7}"/>
@@ -953,7 +953,7 @@
       </p:sp>
       <p:sp>
         <p:nvSpPr>
-          <p:cNvPr id="19" name="Col 3 Title Placeholder 6">
+          <p:cNvPr id="19" name="title_col3_1">
             <a:extLst>
               <a:ext uri="{FF2B5EF4-FFF2-40B4-BE49-F238E27FC236}">
                 <a16:creationId xmlns:a16="http://schemas.microsoft.com/office/drawing/2014/main" id="{D573766F-5004-93C6-42A6-7E3631D73094}"/>
@@ -991,7 +991,7 @@
       </p:sp>
       <p:sp>
         <p:nvSpPr>
-          <p:cNvPr id="20" name="Col 3 Text Placeholder 7">
+          <p:cNvPr id="20" name="content_col3_1">
             <a:extLst>
               <a:ext uri="{FF2B5EF4-FFF2-40B4-BE49-F238E27FC236}">
                 <a16:creationId xmlns:a16="http://schemas.microsoft.com/office/drawing/2014/main" id="{46D4B212-27B2-3CDE-4333-250AB6ED6943}"/>
@@ -1029,7 +1029,7 @@
       </p:sp>
       <p:sp>
         <p:nvSpPr>
-          <p:cNvPr id="3" name="Date Placeholder 10">
+          <p:cNvPr id="3" name="date_footer_1">
             <a:extLst>
               <a:ext uri="{FF2B5EF4-FFF2-40B4-BE49-F238E27FC236}">
                 <a16:creationId xmlns:a16="http://schemas.microsoft.com/office/drawing/2014/main" id="{0C5DD35D-1952-C99B-E166-7B080AC7AFB5}"/>
@@ -1058,7 +1058,7 @@
       </p:sp>
       <p:sp>
         <p:nvSpPr>
-          <p:cNvPr id="4" name="Footer Placeholder 11">
+          <p:cNvPr id="4" name="footer_footer_1">
             <a:extLst>
               <a:ext uri="{FF2B5EF4-FFF2-40B4-BE49-F238E27FC236}">
                 <a16:creationId xmlns:a16="http://schemas.microsoft.com/office/drawing/2014/main" id="{06FE9D83-1B1B-0E92-559C-E83F0EE298A4}"/>
@@ -1083,7 +1083,7 @@
       </p:sp>
       <p:sp>
         <p:nvSpPr>
-          <p:cNvPr id="5" name="Slide Number Placeholder 12">
+          <p:cNvPr id="5" name="slide_number_footer_1">
             <a:extLst>
               <a:ext uri="{FF2B5EF4-FFF2-40B4-BE49-F238E27FC236}">
                 <a16:creationId xmlns:a16="http://schemas.microsoft.com/office/drawing/2014/main" id="{FA093232-03CE-D3D4-9EED-ECB2BD712A7E}"/>
@@ -1158,7 +1158,7 @@
       </p:grpSpPr>
       <p:sp>
         <p:nvSpPr>
-          <p:cNvPr id="2" name="Title 1">
+          <p:cNvPr id="2" name="title_top_1">
             <a:extLst>
               <a:ext uri="{FF2B5EF4-FFF2-40B4-BE49-F238E27FC236}">
                 <a16:creationId xmlns:a16="http://schemas.microsoft.com/office/drawing/2014/main" id="{2EE8977F-7A7D-ED41-7370-2E2BFBEDFFBB}"/>
@@ -1186,7 +1186,7 @@
       </p:sp>
       <p:sp>
         <p:nvSpPr>
-          <p:cNvPr id="16" name="Col 1 Text Placeholder 2">
+          <p:cNvPr id="16" name="content_col1_1">
             <a:extLst>
               <a:ext uri="{FF2B5EF4-FFF2-40B4-BE49-F238E27FC236}">
                 <a16:creationId xmlns:a16="http://schemas.microsoft.com/office/drawing/2014/main" id="{9A8DBF07-BA14-1071-232B-F98DD4E14219}"/>
@@ -1224,7 +1224,7 @@
       </p:sp>
       <p:sp>
         <p:nvSpPr>
-          <p:cNvPr id="18" name="Col 2 Text Placeholder 3">
+          <p:cNvPr id="18" name="content_col2_1">
             <a:extLst>
               <a:ext uri="{FF2B5EF4-FFF2-40B4-BE49-F238E27FC236}">
                 <a16:creationId xmlns:a16="http://schemas.microsoft.com/office/drawing/2014/main" id="{3243E739-7F7F-7D90-BE91-2AD0ED2AACF7}"/>
@@ -1262,7 +1262,7 @@
       </p:sp>
       <p:sp>
         <p:nvSpPr>
-          <p:cNvPr id="20" name="Col 3 Text Placeholder 4">
+          <p:cNvPr id="20" name="content_col3_1">
             <a:extLst>
               <a:ext uri="{FF2B5EF4-FFF2-40B4-BE49-F238E27FC236}">
                 <a16:creationId xmlns:a16="http://schemas.microsoft.com/office/drawing/2014/main" id="{46D4B212-27B2-3CDE-4333-250AB6ED6943}"/>
@@ -1300,7 +1300,7 @@
       </p:sp>
       <p:sp>
         <p:nvSpPr>
-          <p:cNvPr id="3" name="Date Placeholder 10">
+          <p:cNvPr id="3" name="date_footer_1">
             <a:extLst>
               <a:ext uri="{FF2B5EF4-FFF2-40B4-BE49-F238E27FC236}">
                 <a16:creationId xmlns:a16="http://schemas.microsoft.com/office/drawing/2014/main" id="{0C5DD35D-1952-C99B-E166-7B080AC7AFB5}"/>
@@ -1329,7 +1329,7 @@
       </p:sp>
       <p:sp>
         <p:nvSpPr>
-          <p:cNvPr id="4" name="Footer Placeholder 11">
+          <p:cNvPr id="4" name="footer_footer_1">
             <a:extLst>
               <a:ext uri="{FF2B5EF4-FFF2-40B4-BE49-F238E27FC236}">
                 <a16:creationId xmlns:a16="http://schemas.microsoft.com/office/drawing/2014/main" id="{06FE9D83-1B1B-0E92-559C-E83F0EE298A4}"/>
@@ -1354,7 +1354,7 @@
       </p:sp>
       <p:sp>
         <p:nvSpPr>
-          <p:cNvPr id="5" name="Slide Number Placeholder 12">
+          <p:cNvPr id="5" name="slide_number_footer_1">
             <a:extLst>
               <a:ext uri="{FF2B5EF4-FFF2-40B4-BE49-F238E27FC236}">
                 <a16:creationId xmlns:a16="http://schemas.microsoft.com/office/drawing/2014/main" id="{FA093232-03CE-D3D4-9EED-ECB2BD712A7E}"/>
@@ -1429,7 +1429,7 @@
       </p:grpSpPr>
       <p:sp>
         <p:nvSpPr>
-          <p:cNvPr id="2" name="Title 1">
+          <p:cNvPr id="2" name="title_top_1">
             <a:extLst>
               <a:ext uri="{FF2B5EF4-FFF2-40B4-BE49-F238E27FC236}">
                 <a16:creationId xmlns:a16="http://schemas.microsoft.com/office/drawing/2014/main" id="{2EE8977F-7A7D-ED41-7370-2E2BFBEDFFBB}"/>
@@ -1457,7 +1457,7 @@
       </p:sp>
       <p:sp>
         <p:nvSpPr>
-          <p:cNvPr id="15" name="Col 1 Title Placeholder 2">
+          <p:cNvPr id="15" name="title_col1_1">
             <a:extLst>
               <a:ext uri="{FF2B5EF4-FFF2-40B4-BE49-F238E27FC236}">
                 <a16:creationId xmlns:a16="http://schemas.microsoft.com/office/drawing/2014/main" id="{C5582F3A-D943-D22B-50C2-39C5D4F802ED}"/>
@@ -1495,7 +1495,7 @@
       </p:sp>
       <p:sp>
         <p:nvSpPr>
-          <p:cNvPr id="16" name="Col 1 Text Placeholder 3">
+          <p:cNvPr id="16" name="content_col1_1">
             <a:extLst>
               <a:ext uri="{FF2B5EF4-FFF2-40B4-BE49-F238E27FC236}">
                 <a16:creationId xmlns:a16="http://schemas.microsoft.com/office/drawing/2014/main" id="{9A8DBF07-BA14-1071-232B-F98DD4E14219}"/>
@@ -1533,7 +1533,7 @@
       </p:sp>
       <p:sp>
         <p:nvSpPr>
-          <p:cNvPr id="17" name="Col 2 Title Placeholder 4">
+          <p:cNvPr id="17" name="title_col2_1">
             <a:extLst>
               <a:ext uri="{FF2B5EF4-FFF2-40B4-BE49-F238E27FC236}">
                 <a16:creationId xmlns:a16="http://schemas.microsoft.com/office/drawing/2014/main" id="{C68EEECF-A9A2-01FF-29D1-8860960C11F2}"/>
@@ -1571,7 +1571,7 @@
       </p:sp>
       <p:sp>
         <p:nvSpPr>
-          <p:cNvPr id="18" name="Col 2 Text Placeholder 5">
+          <p:cNvPr id="18" name="content_col2_1">
             <a:extLst>
               <a:ext uri="{FF2B5EF4-FFF2-40B4-BE49-F238E27FC236}">
                 <a16:creationId xmlns:a16="http://schemas.microsoft.com/office/drawing/2014/main" id="{3243E739-7F7F-7D90-BE91-2AD0ED2AACF7}"/>
@@ -1609,7 +1609,7 @@
       </p:sp>
       <p:sp>
         <p:nvSpPr>
-          <p:cNvPr id="19" name="Col 3 Title Placeholder 6">
+          <p:cNvPr id="19" name="title_col3_1">
             <a:extLst>
               <a:ext uri="{FF2B5EF4-FFF2-40B4-BE49-F238E27FC236}">
                 <a16:creationId xmlns:a16="http://schemas.microsoft.com/office/drawing/2014/main" id="{D573766F-5004-93C6-42A6-7E3631D73094}"/>
@@ -1647,7 +1647,7 @@
       </p:sp>
       <p:sp>
         <p:nvSpPr>
-          <p:cNvPr id="20" name="Col 3 Text Placeholder 7">
+          <p:cNvPr id="20" name="content_col3_1">
             <a:extLst>
               <a:ext uri="{FF2B5EF4-FFF2-40B4-BE49-F238E27FC236}">
                 <a16:creationId xmlns:a16="http://schemas.microsoft.com/office/drawing/2014/main" id="{46D4B212-27B2-3CDE-4333-250AB6ED6943}"/>
@@ -1685,7 +1685,7 @@
       </p:sp>
       <p:sp>
         <p:nvSpPr>
-          <p:cNvPr id="21" name="Col 4 Title Placeholder 8">
+          <p:cNvPr id="21" name="title_col4_1">
             <a:extLst>
               <a:ext uri="{FF2B5EF4-FFF2-40B4-BE49-F238E27FC236}">
                 <a16:creationId xmlns:a16="http://schemas.microsoft.com/office/drawing/2014/main" id="{F12D07A2-F21E-7459-600E-C4B7BD11CD64}"/>
@@ -1723,7 +1723,7 @@
       </p:sp>
       <p:sp>
         <p:nvSpPr>
-          <p:cNvPr id="22" name="Col 4 Text Placeholder 9">
+          <p:cNvPr id="22" name="content_col4_1">
             <a:extLst>
               <a:ext uri="{FF2B5EF4-FFF2-40B4-BE49-F238E27FC236}">
                 <a16:creationId xmlns:a16="http://schemas.microsoft.com/office/drawing/2014/main" id="{C35A8091-5AA2-245D-989D-83E80FA1E6B3}"/>
@@ -1761,7 +1761,7 @@
       </p:sp>
       <p:sp>
         <p:nvSpPr>
-          <p:cNvPr id="3" name="Date Placeholder 10">
+          <p:cNvPr id="3" name="date_footer_1">
             <a:extLst>
               <a:ext uri="{FF2B5EF4-FFF2-40B4-BE49-F238E27FC236}">
                 <a16:creationId xmlns:a16="http://schemas.microsoft.com/office/drawing/2014/main" id="{0C5DD35D-1952-C99B-E166-7B080AC7AFB5}"/>
@@ -1790,7 +1790,7 @@
       </p:sp>
       <p:sp>
         <p:nvSpPr>
-          <p:cNvPr id="4" name="Footer Placeholder 11">
+          <p:cNvPr id="4" name="footer_footer_1">
             <a:extLst>
               <a:ext uri="{FF2B5EF4-FFF2-40B4-BE49-F238E27FC236}">
                 <a16:creationId xmlns:a16="http://schemas.microsoft.com/office/drawing/2014/main" id="{06FE9D83-1B1B-0E92-559C-E83F0EE298A4}"/>
@@ -1815,7 +1815,7 @@
       </p:sp>
       <p:sp>
         <p:nvSpPr>
-          <p:cNvPr id="5" name="Slide Number Placeholder 12">
+          <p:cNvPr id="5" name="slide_number_footer_1">
             <a:extLst>
               <a:ext uri="{FF2B5EF4-FFF2-40B4-BE49-F238E27FC236}">
                 <a16:creationId xmlns:a16="http://schemas.microsoft.com/office/drawing/2014/main" id="{FA093232-03CE-D3D4-9EED-ECB2BD712A7E}"/>
@@ -1874,7 +1874,7 @@
       </p:grpSpPr>
       <p:sp>
         <p:nvSpPr>
-          <p:cNvPr id="2" name="Title 1">
+          <p:cNvPr id="2" name="title_top_1">
             <a:extLst>
               <a:ext uri="{FF2B5EF4-FFF2-40B4-BE49-F238E27FC236}">
                 <a16:creationId xmlns:a16="http://schemas.microsoft.com/office/drawing/2014/main" id="{2EE8977F-7A7D-ED41-7370-2E2BFBEDFFBB}"/>
@@ -1902,7 +1902,7 @@
       </p:sp>
       <p:sp>
         <p:nvSpPr>
-          <p:cNvPr id="16" name="Col 1 Text Placeholder 3">
+          <p:cNvPr id="16" name="content_col1_1">
             <a:extLst>
               <a:ext uri="{FF2B5EF4-FFF2-40B4-BE49-F238E27FC236}">
                 <a16:creationId xmlns:a16="http://schemas.microsoft.com/office/drawing/2014/main" id="{9A8DBF07-BA14-1071-232B-F98DD4E14219}"/>
@@ -1940,7 +1940,7 @@
       </p:sp>
       <p:sp>
         <p:nvSpPr>
-          <p:cNvPr id="18" name="Col 2 Text Placeholder 2">
+          <p:cNvPr id="18" name="content_col2_1">
             <a:extLst>
               <a:ext uri="{FF2B5EF4-FFF2-40B4-BE49-F238E27FC236}">
                 <a16:creationId xmlns:a16="http://schemas.microsoft.com/office/drawing/2014/main" id="{3243E739-7F7F-7D90-BE91-2AD0ED2AACF7}"/>
@@ -1978,7 +1978,7 @@
       </p:sp>
       <p:sp>
         <p:nvSpPr>
-          <p:cNvPr id="20" name="Col 3 Text Placeholder 4">
+          <p:cNvPr id="20" name="content_col3_1">
             <a:extLst>
               <a:ext uri="{FF2B5EF4-FFF2-40B4-BE49-F238E27FC236}">
                 <a16:creationId xmlns:a16="http://schemas.microsoft.com/office/drawing/2014/main" id="{46D4B212-27B2-3CDE-4333-250AB6ED6943}"/>
@@ -2016,7 +2016,7 @@
       </p:sp>
       <p:sp>
         <p:nvSpPr>
-          <p:cNvPr id="22" name="Col 4 Text Placeholder 4">
+          <p:cNvPr id="22" name="content_col4_1">
             <a:extLst>
               <a:ext uri="{FF2B5EF4-FFF2-40B4-BE49-F238E27FC236}">
                 <a16:creationId xmlns:a16="http://schemas.microsoft.com/office/drawing/2014/main" id="{C35A8091-5AA2-245D-989D-83E80FA1E6B3}"/>
@@ -2054,7 +2054,7 @@
       </p:sp>
       <p:sp>
         <p:nvSpPr>
-          <p:cNvPr id="3" name="Date Placeholder 10">
+          <p:cNvPr id="3" name="date_footer_1">
             <a:extLst>
               <a:ext uri="{FF2B5EF4-FFF2-40B4-BE49-F238E27FC236}">
                 <a16:creationId xmlns:a16="http://schemas.microsoft.com/office/drawing/2014/main" id="{0C5DD35D-1952-C99B-E166-7B080AC7AFB5}"/>
@@ -2083,7 +2083,7 @@
       </p:sp>
       <p:sp>
         <p:nvSpPr>
-          <p:cNvPr id="4" name="Footer Placeholder 11">
+          <p:cNvPr id="4" name="footer_footer_1">
             <a:extLst>
               <a:ext uri="{FF2B5EF4-FFF2-40B4-BE49-F238E27FC236}">
                 <a16:creationId xmlns:a16="http://schemas.microsoft.com/office/drawing/2014/main" id="{06FE9D83-1B1B-0E92-559C-E83F0EE298A4}"/>
@@ -2108,7 +2108,7 @@
       </p:sp>
       <p:sp>
         <p:nvSpPr>
-          <p:cNvPr id="5" name="Slide Number Placeholder 12">
+          <p:cNvPr id="5" name="slide_number_footer_1">
             <a:extLst>
               <a:ext uri="{FF2B5EF4-FFF2-40B4-BE49-F238E27FC236}">
                 <a16:creationId xmlns:a16="http://schemas.microsoft.com/office/drawing/2014/main" id="{FA093232-03CE-D3D4-9EED-ECB2BD712A7E}"/>
@@ -3007,7 +3007,7 @@
       </p:sp>
       <p:sp>
         <p:nvSpPr>
-          <p:cNvPr id="2" name="Title 1">
+          <p:cNvPr id="2" name="title_top_1">
             <a:extLst>
               <a:ext uri="{FF2B5EF4-FFF2-40B4-BE49-F238E27FC236}">
                 <a16:creationId xmlns:a16="http://schemas.microsoft.com/office/drawing/2014/main" id="{4E4019F8-742E-9EEF-F591-C9666AC32AF1}"/>
@@ -3050,7 +3050,7 @@
       </p:sp>
       <p:sp>
         <p:nvSpPr>
-          <p:cNvPr id="4" name="Text Placeholder Number 01">
+          <p:cNvPr id="4" name="number_item1_1">
             <a:extLst>
               <a:ext uri="{FF2B5EF4-FFF2-40B4-BE49-F238E27FC236}">
                 <a16:creationId xmlns:a16="http://schemas.microsoft.com/office/drawing/2014/main" id="{7922A121-F74E-1DBB-F90E-9ECA5D27387F}"/>
@@ -3114,7 +3114,7 @@
       </p:sp>
       <p:sp>
         <p:nvSpPr>
-          <p:cNvPr id="9" name="Text Placeholder Content 1">
+          <p:cNvPr id="9" name="content_item1_1">
             <a:extLst>
               <a:ext uri="{FF2B5EF4-FFF2-40B4-BE49-F238E27FC236}">
                 <a16:creationId xmlns:a16="http://schemas.microsoft.com/office/drawing/2014/main" id="{41A28972-BB4A-9DE5-EC1C-17EC2CEC12C1}"/>
@@ -3183,7 +3183,7 @@
       </p:sp>
       <p:sp>
         <p:nvSpPr>
-          <p:cNvPr id="5" name="Text Placeholder Number 02">
+          <p:cNvPr id="5" name="number_item2_1">
             <a:extLst>
               <a:ext uri="{FF2B5EF4-FFF2-40B4-BE49-F238E27FC236}">
                 <a16:creationId xmlns:a16="http://schemas.microsoft.com/office/drawing/2014/main" id="{A1934284-00BE-576C-F2BA-050CD34490BA}"/>
@@ -3247,7 +3247,7 @@
       </p:sp>
       <p:sp>
         <p:nvSpPr>
-          <p:cNvPr id="22" name="Text Placeholder Content 2">
+          <p:cNvPr id="22" name="content_item2_1">
             <a:extLst>
               <a:ext uri="{FF2B5EF4-FFF2-40B4-BE49-F238E27FC236}">
                 <a16:creationId xmlns:a16="http://schemas.microsoft.com/office/drawing/2014/main" id="{2D4614F8-0641-9496-CFCF-28C79812257F}"/>
@@ -3324,7 +3324,7 @@
       </p:sp>
       <p:sp>
         <p:nvSpPr>
-          <p:cNvPr id="11" name="Text Placeholder Number 03">
+          <p:cNvPr id="11" name="number_item3_1">
             <a:extLst>
               <a:ext uri="{FF2B5EF4-FFF2-40B4-BE49-F238E27FC236}">
                 <a16:creationId xmlns:a16="http://schemas.microsoft.com/office/drawing/2014/main" id="{104425C6-1E3A-2D07-F971-EA5DD926CB83}"/>
@@ -3388,7 +3388,7 @@
       </p:sp>
       <p:sp>
         <p:nvSpPr>
-          <p:cNvPr id="24" name="Text Placeholder Content 3">
+          <p:cNvPr id="24" name="content_item3_1">
             <a:extLst>
               <a:ext uri="{FF2B5EF4-FFF2-40B4-BE49-F238E27FC236}">
                 <a16:creationId xmlns:a16="http://schemas.microsoft.com/office/drawing/2014/main" id="{F10C586E-C370-0572-962A-51D7AD99CB16}"/>
@@ -3465,7 +3465,7 @@
       </p:sp>
       <p:sp>
         <p:nvSpPr>
-          <p:cNvPr id="12" name="Text Placeholder Number 04">
+          <p:cNvPr id="12" name="number_item4_1">
             <a:extLst>
               <a:ext uri="{FF2B5EF4-FFF2-40B4-BE49-F238E27FC236}">
                 <a16:creationId xmlns:a16="http://schemas.microsoft.com/office/drawing/2014/main" id="{676BF66F-CB64-BBEF-FBC9-3B4A250FF543}"/>
@@ -3529,7 +3529,7 @@
       </p:sp>
       <p:sp>
         <p:nvSpPr>
-          <p:cNvPr id="10" name="Text Placeholder Content 4">
+          <p:cNvPr id="10" name="content_item4_1">
             <a:extLst>
               <a:ext uri="{FF2B5EF4-FFF2-40B4-BE49-F238E27FC236}">
                 <a16:creationId xmlns:a16="http://schemas.microsoft.com/office/drawing/2014/main" id="{C15F872C-5958-E6E3-B049-C7D76BD6022C}"/>
@@ -3606,7 +3606,7 @@
       </p:sp>
       <p:sp>
         <p:nvSpPr>
-          <p:cNvPr id="13" name="Text Placeholder Number 05">
+          <p:cNvPr id="13" name="number_item5_1">
             <a:extLst>
               <a:ext uri="{FF2B5EF4-FFF2-40B4-BE49-F238E27FC236}">
                 <a16:creationId xmlns:a16="http://schemas.microsoft.com/office/drawing/2014/main" id="{09563155-4732-CF95-38F9-9E62545CF208}"/>
@@ -3670,7 +3670,7 @@
       </p:sp>
       <p:sp>
         <p:nvSpPr>
-          <p:cNvPr id="23" name="Text Placeholder Content 5">
+          <p:cNvPr id="23" name="content_item5_1">
             <a:extLst>
               <a:ext uri="{FF2B5EF4-FFF2-40B4-BE49-F238E27FC236}">
                 <a16:creationId xmlns:a16="http://schemas.microsoft.com/office/drawing/2014/main" id="{48632D52-9F72-E6F7-9843-8646F95B5FA3}"/>
@@ -3747,7 +3747,7 @@
       </p:sp>
       <p:sp>
         <p:nvSpPr>
-          <p:cNvPr id="3" name="Text Placeholder Number 06">
+          <p:cNvPr id="3" name="number_item6_1">
             <a:extLst>
               <a:ext uri="{FF2B5EF4-FFF2-40B4-BE49-F238E27FC236}">
                 <a16:creationId xmlns:a16="http://schemas.microsoft.com/office/drawing/2014/main" id="{346343EE-8A7A-4634-E149-70C93B1BBD96}"/>
@@ -3811,7 +3811,7 @@
       </p:sp>
       <p:sp>
         <p:nvSpPr>
-          <p:cNvPr id="14" name="Text Placeholder Content 6">
+          <p:cNvPr id="14" name="content_item6_1">
             <a:extLst>
               <a:ext uri="{FF2B5EF4-FFF2-40B4-BE49-F238E27FC236}">
                 <a16:creationId xmlns:a16="http://schemas.microsoft.com/office/drawing/2014/main" id="{E70FC2D7-E550-F15F-22CE-FCD2FD90E5B0}"/>
@@ -3888,7 +3888,7 @@
       </p:sp>
       <p:sp>
         <p:nvSpPr>
-          <p:cNvPr id="21" name="Date Placeholder 10">
+          <p:cNvPr id="21" name="date_footer_1">
             <a:extLst>
               <a:ext uri="{FF2B5EF4-FFF2-40B4-BE49-F238E27FC236}">
                 <a16:creationId xmlns:a16="http://schemas.microsoft.com/office/drawing/2014/main" id="{F983A593-F38C-8AFA-FE6A-B7359628514D}"/>
@@ -3922,7 +3922,7 @@
       </p:sp>
       <p:sp>
         <p:nvSpPr>
-          <p:cNvPr id="25" name="Footer Placeholder 11">
+          <p:cNvPr id="25" name="footer_footer_1">
             <a:extLst>
               <a:ext uri="{FF2B5EF4-FFF2-40B4-BE49-F238E27FC236}">
                 <a16:creationId xmlns:a16="http://schemas.microsoft.com/office/drawing/2014/main" id="{3704991B-DDAA-2769-42ED-44927C9842A2}"/>
@@ -3952,7 +3952,7 @@
       </p:sp>
       <p:sp>
         <p:nvSpPr>
-          <p:cNvPr id="26" name="Slide Number Placeholder 12">
+          <p:cNvPr id="26" name="slide_number_footer_1">
             <a:extLst>
               <a:ext uri="{FF2B5EF4-FFF2-40B4-BE49-F238E27FC236}">
                 <a16:creationId xmlns:a16="http://schemas.microsoft.com/office/drawing/2014/main" id="{41615C5F-6DB5-9390-FA55-46987A73A418}"/>
@@ -4016,7 +4016,7 @@
       </p:grpSpPr>
       <p:sp>
         <p:nvSpPr>
-          <p:cNvPr id="2" name="Title 1">
+          <p:cNvPr id="2" name="title_top_1">
             <a:extLst>
               <a:ext uri="{FF2B5EF4-FFF2-40B4-BE49-F238E27FC236}">
                 <a16:creationId xmlns:a16="http://schemas.microsoft.com/office/drawing/2014/main" id="{666A9F42-7FF7-F803-C075-BC4968D35E34}"/>
@@ -4197,7 +4197,7 @@
       </p:sp>
       <p:sp>
         <p:nvSpPr>
-          <p:cNvPr id="7" name="Text Placeholder Number 01">
+          <p:cNvPr id="7" name="content_25">
             <a:extLst>
               <a:ext uri="{FF2B5EF4-FFF2-40B4-BE49-F238E27FC236}">
                 <a16:creationId xmlns:a16="http://schemas.microsoft.com/office/drawing/2014/main" id="{1CA25D2A-079E-516D-CCAD-9201655031B8}"/>
@@ -4245,7 +4245,7 @@
       </p:sp>
       <p:sp>
         <p:nvSpPr>
-          <p:cNvPr id="39" name="Text Placeholder Title 1">
+          <p:cNvPr id="39" name="content_13">
             <a:extLst>
               <a:ext uri="{FF2B5EF4-FFF2-40B4-BE49-F238E27FC236}">
                 <a16:creationId xmlns:a16="http://schemas.microsoft.com/office/drawing/2014/main" id="{BC32326B-44AF-69A5-8950-3E83EB14E481}"/>
@@ -4337,7 +4337,7 @@
       </p:sp>
       <p:sp>
         <p:nvSpPr>
-          <p:cNvPr id="38" name="Text Placeholder Content 1">
+          <p:cNvPr id="38" name="content_14">
             <a:extLst>
               <a:ext uri="{FF2B5EF4-FFF2-40B4-BE49-F238E27FC236}">
                 <a16:creationId xmlns:a16="http://schemas.microsoft.com/office/drawing/2014/main" id="{CCC11960-F75C-F63F-D4E4-8C19C5B89901}"/>
@@ -4584,7 +4584,7 @@
       </p:sp>
       <p:sp>
         <p:nvSpPr>
-          <p:cNvPr id="8" name="Text Placeholder Number 02">
+          <p:cNvPr id="8" name="content_26">
             <a:extLst>
               <a:ext uri="{FF2B5EF4-FFF2-40B4-BE49-F238E27FC236}">
                 <a16:creationId xmlns:a16="http://schemas.microsoft.com/office/drawing/2014/main" id="{6CDFDE77-EF7F-9B62-D5CB-295BB8C3EBBD}"/>
@@ -4632,7 +4632,7 @@
       </p:sp>
       <p:sp>
         <p:nvSpPr>
-          <p:cNvPr id="44" name="Text Placeholder Title 2">
+          <p:cNvPr id="44" name="content_item1_1">
             <a:extLst>
               <a:ext uri="{FF2B5EF4-FFF2-40B4-BE49-F238E27FC236}">
                 <a16:creationId xmlns:a16="http://schemas.microsoft.com/office/drawing/2014/main" id="{0290AD35-CF09-6504-D01E-4C05D706F1C1}"/>
@@ -4724,7 +4724,7 @@
       </p:sp>
       <p:sp>
         <p:nvSpPr>
-          <p:cNvPr id="43" name="Text Placeholder Content 2">
+          <p:cNvPr id="43" name="content_17">
             <a:extLst>
               <a:ext uri="{FF2B5EF4-FFF2-40B4-BE49-F238E27FC236}">
                 <a16:creationId xmlns:a16="http://schemas.microsoft.com/office/drawing/2014/main" id="{05368349-BD70-533F-1B19-8FD3F67FB75C}"/>
@@ -4971,7 +4971,7 @@
       </p:sp>
       <p:sp>
         <p:nvSpPr>
-          <p:cNvPr id="9" name="Text Placeholder Number 03">
+          <p:cNvPr id="9" name="content_27">
             <a:extLst>
               <a:ext uri="{FF2B5EF4-FFF2-40B4-BE49-F238E27FC236}">
                 <a16:creationId xmlns:a16="http://schemas.microsoft.com/office/drawing/2014/main" id="{867C06B3-86F3-BA14-C074-170923D252F1}"/>
@@ -5019,7 +5019,7 @@
       </p:sp>
       <p:sp>
         <p:nvSpPr>
-          <p:cNvPr id="49" name="Text Placeholder Title 3">
+          <p:cNvPr id="49" name="content_item3_1">
             <a:extLst>
               <a:ext uri="{FF2B5EF4-FFF2-40B4-BE49-F238E27FC236}">
                 <a16:creationId xmlns:a16="http://schemas.microsoft.com/office/drawing/2014/main" id="{C7E3638A-E47B-2C16-051A-8CB00B9F895C}"/>
@@ -5111,7 +5111,7 @@
       </p:sp>
       <p:sp>
         <p:nvSpPr>
-          <p:cNvPr id="48" name="Text Placeholder Content 3">
+          <p:cNvPr id="48" name="content_item5_1">
             <a:extLst>
               <a:ext uri="{FF2B5EF4-FFF2-40B4-BE49-F238E27FC236}">
                 <a16:creationId xmlns:a16="http://schemas.microsoft.com/office/drawing/2014/main" id="{5A4CC468-3A85-49F0-099C-BC1F0F566DC3}"/>
@@ -5358,7 +5358,7 @@
       </p:sp>
       <p:sp>
         <p:nvSpPr>
-          <p:cNvPr id="15" name="Text Placeholder Number 04">
+          <p:cNvPr id="15" name="number_item3_1">
             <a:extLst>
               <a:ext uri="{FF2B5EF4-FFF2-40B4-BE49-F238E27FC236}">
                 <a16:creationId xmlns:a16="http://schemas.microsoft.com/office/drawing/2014/main" id="{2E5F3B0A-2795-1AB7-EDA7-048B8FFC1801}"/>
@@ -5406,7 +5406,7 @@
       </p:sp>
       <p:sp>
         <p:nvSpPr>
-          <p:cNvPr id="51" name="Text Placeholder Title 4">
+          <p:cNvPr id="51" name="content_24">
             <a:extLst>
               <a:ext uri="{FF2B5EF4-FFF2-40B4-BE49-F238E27FC236}">
                 <a16:creationId xmlns:a16="http://schemas.microsoft.com/office/drawing/2014/main" id="{0F680350-5C6D-05CD-2861-1CBCFF6E39DA}"/>
@@ -5498,7 +5498,7 @@
       </p:sp>
       <p:sp>
         <p:nvSpPr>
-          <p:cNvPr id="50" name="Text Placeholder Content 4">
+          <p:cNvPr id="50" name="content_23">
             <a:extLst>
               <a:ext uri="{FF2B5EF4-FFF2-40B4-BE49-F238E27FC236}">
                 <a16:creationId xmlns:a16="http://schemas.microsoft.com/office/drawing/2014/main" id="{66541D57-A12D-E924-D596-DE278CD7F4D7}"/>
@@ -5745,7 +5745,7 @@
       </p:sp>
       <p:sp>
         <p:nvSpPr>
-          <p:cNvPr id="14" name="Text Placeholder Number 05">
+          <p:cNvPr id="14" name="number_item2_1">
             <a:extLst>
               <a:ext uri="{FF2B5EF4-FFF2-40B4-BE49-F238E27FC236}">
                 <a16:creationId xmlns:a16="http://schemas.microsoft.com/office/drawing/2014/main" id="{E73C2B03-4A5F-AABA-EC88-7F080083184F}"/>
@@ -5793,7 +5793,7 @@
       </p:sp>
       <p:sp>
         <p:nvSpPr>
-          <p:cNvPr id="46" name="Text Placeholder Title 5">
+          <p:cNvPr id="46" name="content_item2_1">
             <a:extLst>
               <a:ext uri="{FF2B5EF4-FFF2-40B4-BE49-F238E27FC236}">
                 <a16:creationId xmlns:a16="http://schemas.microsoft.com/office/drawing/2014/main" id="{9EBEE5F4-6259-F130-927E-7FFB60A40FD6}"/>
@@ -5885,7 +5885,7 @@
       </p:sp>
       <p:sp>
         <p:nvSpPr>
-          <p:cNvPr id="45" name="Text Placeholder Content 5">
+          <p:cNvPr id="45" name="content_item4_1">
             <a:extLst>
               <a:ext uri="{FF2B5EF4-FFF2-40B4-BE49-F238E27FC236}">
                 <a16:creationId xmlns:a16="http://schemas.microsoft.com/office/drawing/2014/main" id="{66237AC4-EBD4-DD9E-69D9-8D385F6C75A6}"/>
@@ -6132,7 +6132,7 @@
       </p:sp>
       <p:sp>
         <p:nvSpPr>
-          <p:cNvPr id="13" name="Text Placeholder Number 06">
+          <p:cNvPr id="13" name="number_item1_1">
             <a:extLst>
               <a:ext uri="{FF2B5EF4-FFF2-40B4-BE49-F238E27FC236}">
                 <a16:creationId xmlns:a16="http://schemas.microsoft.com/office/drawing/2014/main" id="{5DB5C80C-26F8-0C95-154F-6DEEEDB32371}"/>
@@ -6180,7 +6180,7 @@
       </p:sp>
       <p:sp>
         <p:nvSpPr>
-          <p:cNvPr id="41" name="Text Placeholder Title 6">
+          <p:cNvPr id="41" name="content_16">
             <a:extLst>
               <a:ext uri="{FF2B5EF4-FFF2-40B4-BE49-F238E27FC236}">
                 <a16:creationId xmlns:a16="http://schemas.microsoft.com/office/drawing/2014/main" id="{1580A2FB-D18E-CCE5-D7D5-AB29B0225C05}"/>
@@ -6272,7 +6272,7 @@
       </p:sp>
       <p:sp>
         <p:nvSpPr>
-          <p:cNvPr id="40" name="Text Placeholder 10">
+          <p:cNvPr id="40" name="content_15">
             <a:extLst>
               <a:ext uri="{FF2B5EF4-FFF2-40B4-BE49-F238E27FC236}">
                 <a16:creationId xmlns:a16="http://schemas.microsoft.com/office/drawing/2014/main" id="{8B832846-EB9F-5EFA-F397-ED05D7CD5CBB}"/>
@@ -7536,7 +7536,7 @@
       </p:sp>
       <p:sp>
         <p:nvSpPr>
-          <p:cNvPr id="3" name="Date Placeholder 10">
+          <p:cNvPr id="3" name="date_footer_1">
             <a:extLst>
               <a:ext uri="{FF2B5EF4-FFF2-40B4-BE49-F238E27FC236}">
                 <a16:creationId xmlns:a16="http://schemas.microsoft.com/office/drawing/2014/main" id="{5A8B6810-D233-996D-4DDF-C06BD0CB9A5A}"/>
@@ -7570,7 +7570,7 @@
       </p:sp>
       <p:sp>
         <p:nvSpPr>
-          <p:cNvPr id="4" name="Footer Placeholder 11">
+          <p:cNvPr id="4" name="footer_footer_1">
             <a:extLst>
               <a:ext uri="{FF2B5EF4-FFF2-40B4-BE49-F238E27FC236}">
                 <a16:creationId xmlns:a16="http://schemas.microsoft.com/office/drawing/2014/main" id="{EFC8C12A-DE08-BA6B-0CED-4D57F46C9680}"/>
@@ -7600,7 +7600,7 @@
       </p:sp>
       <p:sp>
         <p:nvSpPr>
-          <p:cNvPr id="5" name="Slide Number Placeholder 12">
+          <p:cNvPr id="5" name="slide_number_footer_1">
             <a:extLst>
               <a:ext uri="{FF2B5EF4-FFF2-40B4-BE49-F238E27FC236}">
                 <a16:creationId xmlns:a16="http://schemas.microsoft.com/office/drawing/2014/main" id="{15B3EF65-8890-DC92-F5F2-8E60B6F35305}"/>
@@ -7664,7 +7664,7 @@
       </p:grpSpPr>
       <p:sp>
         <p:nvSpPr>
-          <p:cNvPr id="2" name="Title 1">
+          <p:cNvPr id="2" name="title_top_1">
             <a:extLst>
               <a:ext uri="{FF2B5EF4-FFF2-40B4-BE49-F238E27FC236}">
                 <a16:creationId xmlns:a16="http://schemas.microsoft.com/office/drawing/2014/main" id="{E4336E9A-8E96-CD8C-7598-F87632CD81CF}"/>
@@ -7707,7 +7707,7 @@
       </p:sp>
       <p:sp>
         <p:nvSpPr>
-          <p:cNvPr id="3" name="Subtitle 2">
+          <p:cNvPr id="3" name="content_1">
             <a:extLst>
               <a:ext uri="{FF2B5EF4-FFF2-40B4-BE49-F238E27FC236}">
                 <a16:creationId xmlns:a16="http://schemas.microsoft.com/office/drawing/2014/main" id="{2BDC76B8-60F6-62D3-9F73-E81662203017}"/>
@@ -7783,7 +7783,7 @@
       </p:sp>
       <p:sp>
         <p:nvSpPr>
-          <p:cNvPr id="4" name="Date Placeholder 10">
+          <p:cNvPr id="4" name="date_footer_1">
             <a:extLst>
               <a:ext uri="{FF2B5EF4-FFF2-40B4-BE49-F238E27FC236}">
                 <a16:creationId xmlns:a16="http://schemas.microsoft.com/office/drawing/2014/main" id="{5C740740-642A-05CB-CC9F-1DC9240B260E}"/>
@@ -7817,7 +7817,7 @@
       </p:sp>
       <p:sp>
         <p:nvSpPr>
-          <p:cNvPr id="5" name="Footer Placeholder 11">
+          <p:cNvPr id="5" name="footer_footer_1">
             <a:extLst>
               <a:ext uri="{FF2B5EF4-FFF2-40B4-BE49-F238E27FC236}">
                 <a16:creationId xmlns:a16="http://schemas.microsoft.com/office/drawing/2014/main" id="{885655D9-AA5E-F291-7A59-6B22014D4037}"/>
@@ -7847,7 +7847,7 @@
       </p:sp>
       <p:sp>
         <p:nvSpPr>
-          <p:cNvPr id="6" name="Slide Number Placeholder 12">
+          <p:cNvPr id="6" name="slide_number_footer_1">
             <a:extLst>
               <a:ext uri="{FF2B5EF4-FFF2-40B4-BE49-F238E27FC236}">
                 <a16:creationId xmlns:a16="http://schemas.microsoft.com/office/drawing/2014/main" id="{F49B6A9E-B05B-5C4F-FA33-8D5E0A9E2338}"/>
@@ -7927,7 +7927,7 @@
       </p:grpSpPr>
       <p:sp>
         <p:nvSpPr>
-          <p:cNvPr id="2" name="Date Placeholder 1">
+          <p:cNvPr id="2" name="date_footer_1">
             <a:extLst>
               <a:ext uri="{FF2B5EF4-FFF2-40B4-BE49-F238E27FC236}">
                 <a16:creationId xmlns:a16="http://schemas.microsoft.com/office/drawing/2014/main" id="{96C81B9D-47B6-B0B5-2504-6CFC56639DAC}"/>
@@ -7956,7 +7956,7 @@
       </p:sp>
       <p:sp>
         <p:nvSpPr>
-          <p:cNvPr id="3" name="Footer Placeholder 2">
+          <p:cNvPr id="3" name="footer_footer_1">
             <a:extLst>
               <a:ext uri="{FF2B5EF4-FFF2-40B4-BE49-F238E27FC236}">
                 <a16:creationId xmlns:a16="http://schemas.microsoft.com/office/drawing/2014/main" id="{9B911889-8BA3-6D6C-44C3-ACA9D77471AD}"/>
@@ -7981,7 +7981,7 @@
       </p:sp>
       <p:sp>
         <p:nvSpPr>
-          <p:cNvPr id="4" name="Slide Number Placeholder 3">
+          <p:cNvPr id="4" name="slide_number_footer_1">
             <a:extLst>
               <a:ext uri="{FF2B5EF4-FFF2-40B4-BE49-F238E27FC236}">
                 <a16:creationId xmlns:a16="http://schemas.microsoft.com/office/drawing/2014/main" id="{CE7A5EE5-3CDF-03B4-3589-866B3437F05C}"/>
@@ -8010,7 +8010,7 @@
       </p:sp>
       <p:sp>
         <p:nvSpPr>
-          <p:cNvPr id="26" name="Text Placeholder Bottom Right">
+          <p:cNvPr id="26" name="content_16">
             <a:extLst>
               <a:ext uri="{FF2B5EF4-FFF2-40B4-BE49-F238E27FC236}">
                 <a16:creationId xmlns:a16="http://schemas.microsoft.com/office/drawing/2014/main" id="{42E77249-2175-C589-1BF1-E79E0635473A}"/>
@@ -8078,7 +8078,7 @@
       </p:sp>
       <p:sp>
         <p:nvSpPr>
-          <p:cNvPr id="27" name="Text Placeholder Top Right">
+          <p:cNvPr id="27" name="content_17">
             <a:extLst>
               <a:ext uri="{FF2B5EF4-FFF2-40B4-BE49-F238E27FC236}">
                 <a16:creationId xmlns:a16="http://schemas.microsoft.com/office/drawing/2014/main" id="{51628B60-961D-665B-F6C3-732491D38BB9}"/>
@@ -8146,7 +8146,7 @@
       </p:sp>
       <p:sp>
         <p:nvSpPr>
-          <p:cNvPr id="28" name="Text Placeholder Bottom Left">
+          <p:cNvPr id="28" name="content_18">
             <a:extLst>
               <a:ext uri="{FF2B5EF4-FFF2-40B4-BE49-F238E27FC236}">
                 <a16:creationId xmlns:a16="http://schemas.microsoft.com/office/drawing/2014/main" id="{D751D188-82D0-B381-C234-7DD4F5EB595C}"/>
@@ -8214,7 +8214,7 @@
       </p:sp>
       <p:sp>
         <p:nvSpPr>
-          <p:cNvPr id="29" name="Text Placeholder Top Left">
+          <p:cNvPr id="29" name="content_19">
             <a:extLst>
               <a:ext uri="{FF2B5EF4-FFF2-40B4-BE49-F238E27FC236}">
                 <a16:creationId xmlns:a16="http://schemas.microsoft.com/office/drawing/2014/main" id="{B0A5CF0E-F4A4-002B-E8F8-28011639E48A}"/>
@@ -8312,7 +8312,7 @@
       </p:grpSpPr>
       <p:sp>
         <p:nvSpPr>
-          <p:cNvPr id="2" name="Title 1">
+          <p:cNvPr id="2" name="title_top_1">
             <a:extLst>
               <a:ext uri="{FF2B5EF4-FFF2-40B4-BE49-F238E27FC236}">
                 <a16:creationId xmlns:a16="http://schemas.microsoft.com/office/drawing/2014/main" id="{936320B5-3B09-2712-F489-3173237EFA24}"/>
@@ -8340,7 +8340,7 @@
       </p:sp>
       <p:sp>
         <p:nvSpPr>
-          <p:cNvPr id="3" name="Content Placeholder 2">
+          <p:cNvPr id="3" name="content_1">
             <a:extLst>
               <a:ext uri="{FF2B5EF4-FFF2-40B4-BE49-F238E27FC236}">
                 <a16:creationId xmlns:a16="http://schemas.microsoft.com/office/drawing/2014/main" id="{D1E7D0BC-1FE8-F732-1F77-1B44ED986BE9}"/>
@@ -8397,7 +8397,7 @@
       </p:sp>
       <p:sp>
         <p:nvSpPr>
-          <p:cNvPr id="4" name="Date Placeholder 3">
+          <p:cNvPr id="4" name="date_footer_1">
             <a:extLst>
               <a:ext uri="{FF2B5EF4-FFF2-40B4-BE49-F238E27FC236}">
                 <a16:creationId xmlns:a16="http://schemas.microsoft.com/office/drawing/2014/main" id="{F3E8509B-696E-FF26-4FE1-44C368900807}"/>
@@ -8426,7 +8426,7 @@
       </p:sp>
       <p:sp>
         <p:nvSpPr>
-          <p:cNvPr id="5" name="Footer Placeholder 4">
+          <p:cNvPr id="5" name="footer_footer_1">
             <a:extLst>
               <a:ext uri="{FF2B5EF4-FFF2-40B4-BE49-F238E27FC236}">
                 <a16:creationId xmlns:a16="http://schemas.microsoft.com/office/drawing/2014/main" id="{5C9DFDB6-CF10-BC20-2915-3DC022E29350}"/>
@@ -8451,7 +8451,7 @@
       </p:sp>
       <p:sp>
         <p:nvSpPr>
-          <p:cNvPr id="6" name="Slide Number Placeholder 5">
+          <p:cNvPr id="6" name="slide_number_footer_1">
             <a:extLst>
               <a:ext uri="{FF2B5EF4-FFF2-40B4-BE49-F238E27FC236}">
                 <a16:creationId xmlns:a16="http://schemas.microsoft.com/office/drawing/2014/main" id="{711CADE5-6EB6-4288-1EE2-979A6CBD57C3}"/>
@@ -8510,7 +8510,7 @@
       </p:grpSpPr>
       <p:sp>
         <p:nvSpPr>
-          <p:cNvPr id="2" name="Title 1">
+          <p:cNvPr id="2" name="title_top_1">
             <a:extLst>
               <a:ext uri="{FF2B5EF4-FFF2-40B4-BE49-F238E27FC236}">
                 <a16:creationId xmlns:a16="http://schemas.microsoft.com/office/drawing/2014/main" id="{DEBE0B7E-AA23-739F-44BB-2AB172CAAFA4}"/>
@@ -8547,7 +8547,7 @@
       </p:sp>
       <p:sp>
         <p:nvSpPr>
-          <p:cNvPr id="3" name="Text Placeholder 2">
+          <p:cNvPr id="3" name="text_1">
             <a:extLst>
               <a:ext uri="{FF2B5EF4-FFF2-40B4-BE49-F238E27FC236}">
                 <a16:creationId xmlns:a16="http://schemas.microsoft.com/office/drawing/2014/main" id="{5AC24772-3DA8-7B98-01F5-8ECAC2A39C1A}"/>
@@ -8672,7 +8672,7 @@
       </p:sp>
       <p:sp>
         <p:nvSpPr>
-          <p:cNvPr id="4" name="Date Placeholder 3">
+          <p:cNvPr id="4" name="date_footer_1">
             <a:extLst>
               <a:ext uri="{FF2B5EF4-FFF2-40B4-BE49-F238E27FC236}">
                 <a16:creationId xmlns:a16="http://schemas.microsoft.com/office/drawing/2014/main" id="{25527903-74DF-8563-E5E8-46A8C8576813}"/>
@@ -8701,7 +8701,7 @@
       </p:sp>
       <p:sp>
         <p:nvSpPr>
-          <p:cNvPr id="5" name="Footer Placeholder 4">
+          <p:cNvPr id="5" name="footer_footer_1">
             <a:extLst>
               <a:ext uri="{FF2B5EF4-FFF2-40B4-BE49-F238E27FC236}">
                 <a16:creationId xmlns:a16="http://schemas.microsoft.com/office/drawing/2014/main" id="{03FCDC84-DADA-4EFE-32E6-651C07CF5FD9}"/>
@@ -8726,7 +8726,7 @@
       </p:sp>
       <p:sp>
         <p:nvSpPr>
-          <p:cNvPr id="6" name="Slide Number Placeholder 5">
+          <p:cNvPr id="6" name="slide_number_footer_1">
             <a:extLst>
               <a:ext uri="{FF2B5EF4-FFF2-40B4-BE49-F238E27FC236}">
                 <a16:creationId xmlns:a16="http://schemas.microsoft.com/office/drawing/2014/main" id="{640EF1B5-6CED-6D09-9DC0-95F299570B9D}"/>
@@ -8785,7 +8785,7 @@
       </p:grpSpPr>
       <p:sp>
         <p:nvSpPr>
-          <p:cNvPr id="2" name="Title 1">
+          <p:cNvPr id="2" name="title_top_1">
             <a:extLst>
               <a:ext uri="{FF2B5EF4-FFF2-40B4-BE49-F238E27FC236}">
                 <a16:creationId xmlns:a16="http://schemas.microsoft.com/office/drawing/2014/main" id="{0F38DD02-1D84-971F-219D-ABEAF1D81409}"/>
@@ -8813,7 +8813,7 @@
       </p:sp>
       <p:sp>
         <p:nvSpPr>
-          <p:cNvPr id="3" name="Content Placeholder 2">
+          <p:cNvPr id="3" name="content_left_1">
             <a:extLst>
               <a:ext uri="{FF2B5EF4-FFF2-40B4-BE49-F238E27FC236}">
                 <a16:creationId xmlns:a16="http://schemas.microsoft.com/office/drawing/2014/main" id="{68779667-283B-01FA-8294-375A07C9C724}"/>
@@ -8875,7 +8875,7 @@
       </p:sp>
       <p:sp>
         <p:nvSpPr>
-          <p:cNvPr id="4" name="Content Placeholder 3">
+          <p:cNvPr id="4" name="content_right_1">
             <a:extLst>
               <a:ext uri="{FF2B5EF4-FFF2-40B4-BE49-F238E27FC236}">
                 <a16:creationId xmlns:a16="http://schemas.microsoft.com/office/drawing/2014/main" id="{3CA78424-686E-19C4-2223-AD3644EAF431}"/>
@@ -8937,7 +8937,7 @@
       </p:sp>
       <p:sp>
         <p:nvSpPr>
-          <p:cNvPr id="5" name="Date Placeholder 4">
+          <p:cNvPr id="5" name="date_footer_1">
             <a:extLst>
               <a:ext uri="{FF2B5EF4-FFF2-40B4-BE49-F238E27FC236}">
                 <a16:creationId xmlns:a16="http://schemas.microsoft.com/office/drawing/2014/main" id="{A50666D6-FACE-CBAE-DE7A-6833FEBFDAEA}"/>
@@ -8966,7 +8966,7 @@
       </p:sp>
       <p:sp>
         <p:nvSpPr>
-          <p:cNvPr id="6" name="Footer Placeholder 5">
+          <p:cNvPr id="6" name="footer_footer_1">
             <a:extLst>
               <a:ext uri="{FF2B5EF4-FFF2-40B4-BE49-F238E27FC236}">
                 <a16:creationId xmlns:a16="http://schemas.microsoft.com/office/drawing/2014/main" id="{CB84FBD2-6A70-6780-629A-6DCACAC4C5C3}"/>
@@ -8991,7 +8991,7 @@
       </p:sp>
       <p:sp>
         <p:nvSpPr>
-          <p:cNvPr id="7" name="Slide Number Placeholder 6">
+          <p:cNvPr id="7" name="slide_number_footer_1">
             <a:extLst>
               <a:ext uri="{FF2B5EF4-FFF2-40B4-BE49-F238E27FC236}">
                 <a16:creationId xmlns:a16="http://schemas.microsoft.com/office/drawing/2014/main" id="{28B8B21C-ADF8-9AEC-B1C2-1FB0D14F71A0}"/>
@@ -9050,7 +9050,7 @@
       </p:grpSpPr>
       <p:sp>
         <p:nvSpPr>
-          <p:cNvPr id="2" name="Title 1">
+          <p:cNvPr id="2" name="title_top_1">
             <a:extLst>
               <a:ext uri="{FF2B5EF4-FFF2-40B4-BE49-F238E27FC236}">
                 <a16:creationId xmlns:a16="http://schemas.microsoft.com/office/drawing/2014/main" id="{344942AA-343E-93BC-7C95-F3A7D2AFD359}"/>
@@ -9083,7 +9083,7 @@
       </p:sp>
       <p:sp>
         <p:nvSpPr>
-          <p:cNvPr id="3" name="Text Placeholder 2">
+          <p:cNvPr id="3" name="title_left_1">
             <a:extLst>
               <a:ext uri="{FF2B5EF4-FFF2-40B4-BE49-F238E27FC236}">
                 <a16:creationId xmlns:a16="http://schemas.microsoft.com/office/drawing/2014/main" id="{3B99860B-8335-4A2C-01D6-61113F7BE8E3}"/>
@@ -9154,7 +9154,7 @@
       </p:sp>
       <p:sp>
         <p:nvSpPr>
-          <p:cNvPr id="4" name="Content Placeholder 3">
+          <p:cNvPr id="4" name="content_left_1">
             <a:extLst>
               <a:ext uri="{FF2B5EF4-FFF2-40B4-BE49-F238E27FC236}">
                 <a16:creationId xmlns:a16="http://schemas.microsoft.com/office/drawing/2014/main" id="{24111872-E559-20AA-D15F-0CC5729BE44C}"/>
@@ -9216,7 +9216,7 @@
       </p:sp>
       <p:sp>
         <p:nvSpPr>
-          <p:cNvPr id="5" name="Text Placeholder 4">
+          <p:cNvPr id="5" name="title_right_1">
             <a:extLst>
               <a:ext uri="{FF2B5EF4-FFF2-40B4-BE49-F238E27FC236}">
                 <a16:creationId xmlns:a16="http://schemas.microsoft.com/office/drawing/2014/main" id="{30D71C89-F5B5-EEA8-F9D1-63D1A3DB59CF}"/>
@@ -9287,7 +9287,7 @@
       </p:sp>
       <p:sp>
         <p:nvSpPr>
-          <p:cNvPr id="6" name="Content Placeholder 5">
+          <p:cNvPr id="6" name="content_right_1">
             <a:extLst>
               <a:ext uri="{FF2B5EF4-FFF2-40B4-BE49-F238E27FC236}">
                 <a16:creationId xmlns:a16="http://schemas.microsoft.com/office/drawing/2014/main" id="{02AD09D2-6A5B-C3BF-30D1-C8A8A681F147}"/>
@@ -9349,7 +9349,7 @@
       </p:sp>
       <p:sp>
         <p:nvSpPr>
-          <p:cNvPr id="7" name="Date Placeholder 6">
+          <p:cNvPr id="7" name="date_footer_1">
             <a:extLst>
               <a:ext uri="{FF2B5EF4-FFF2-40B4-BE49-F238E27FC236}">
                 <a16:creationId xmlns:a16="http://schemas.microsoft.com/office/drawing/2014/main" id="{4D572917-F65B-6EDF-0060-213541FE1469}"/>
@@ -9378,7 +9378,7 @@
       </p:sp>
       <p:sp>
         <p:nvSpPr>
-          <p:cNvPr id="8" name="Footer Placeholder 7">
+          <p:cNvPr id="8" name="footer_footer_1">
             <a:extLst>
               <a:ext uri="{FF2B5EF4-FFF2-40B4-BE49-F238E27FC236}">
                 <a16:creationId xmlns:a16="http://schemas.microsoft.com/office/drawing/2014/main" id="{1B3F2CD2-8359-7886-0193-1BC7F1FB2276}"/>
@@ -9403,7 +9403,7 @@
       </p:sp>
       <p:sp>
         <p:nvSpPr>
-          <p:cNvPr id="9" name="Slide Number Placeholder 8">
+          <p:cNvPr id="9" name="slide_number_footer_1">
             <a:extLst>
               <a:ext uri="{FF2B5EF4-FFF2-40B4-BE49-F238E27FC236}">
                 <a16:creationId xmlns:a16="http://schemas.microsoft.com/office/drawing/2014/main" id="{AF74797B-ACEA-E082-B62D-DC01F3C830EE}"/>
@@ -9462,7 +9462,7 @@
       </p:grpSpPr>
       <p:sp>
         <p:nvSpPr>
-          <p:cNvPr id="2" name="Title 1">
+          <p:cNvPr id="2" name="title_top_1">
             <a:extLst>
               <a:ext uri="{FF2B5EF4-FFF2-40B4-BE49-F238E27FC236}">
                 <a16:creationId xmlns:a16="http://schemas.microsoft.com/office/drawing/2014/main" id="{4A03CBFB-B82C-66BE-0186-1379617348B2}"/>
@@ -9490,7 +9490,7 @@
       </p:sp>
       <p:sp>
         <p:nvSpPr>
-          <p:cNvPr id="3" name="Date Placeholder 2">
+          <p:cNvPr id="3" name="date_footer_1">
             <a:extLst>
               <a:ext uri="{FF2B5EF4-FFF2-40B4-BE49-F238E27FC236}">
                 <a16:creationId xmlns:a16="http://schemas.microsoft.com/office/drawing/2014/main" id="{87D4F309-CC62-3032-2EE7-33F4976FC508}"/>
@@ -9519,7 +9519,7 @@
       </p:sp>
       <p:sp>
         <p:nvSpPr>
-          <p:cNvPr id="4" name="Footer Placeholder 3">
+          <p:cNvPr id="4" name="footer_footer_1">
             <a:extLst>
               <a:ext uri="{FF2B5EF4-FFF2-40B4-BE49-F238E27FC236}">
                 <a16:creationId xmlns:a16="http://schemas.microsoft.com/office/drawing/2014/main" id="{690FF4BC-7595-6782-038E-E0CE5A45A10D}"/>
@@ -9544,7 +9544,7 @@
       </p:sp>
       <p:sp>
         <p:nvSpPr>
-          <p:cNvPr id="5" name="Slide Number Placeholder 4">
+          <p:cNvPr id="5" name="slide_number_footer_1">
             <a:extLst>
               <a:ext uri="{FF2B5EF4-FFF2-40B4-BE49-F238E27FC236}">
                 <a16:creationId xmlns:a16="http://schemas.microsoft.com/office/drawing/2014/main" id="{57249B9B-302A-3551-62F9-777EF78DC4F1}"/>
@@ -9603,7 +9603,7 @@
       </p:grpSpPr>
       <p:sp>
         <p:nvSpPr>
-          <p:cNvPr id="2" name="Date Placeholder 1">
+          <p:cNvPr id="2" name="date_footer_1">
             <a:extLst>
               <a:ext uri="{FF2B5EF4-FFF2-40B4-BE49-F238E27FC236}">
                 <a16:creationId xmlns:a16="http://schemas.microsoft.com/office/drawing/2014/main" id="{7E144A57-1D3F-753F-432B-D6103D24EEED}"/>
@@ -9632,7 +9632,7 @@
       </p:sp>
       <p:sp>
         <p:nvSpPr>
-          <p:cNvPr id="3" name="Footer Placeholder 2">
+          <p:cNvPr id="3" name="footer_footer_1">
             <a:extLst>
               <a:ext uri="{FF2B5EF4-FFF2-40B4-BE49-F238E27FC236}">
                 <a16:creationId xmlns:a16="http://schemas.microsoft.com/office/drawing/2014/main" id="{E81DD142-52A3-259B-59C3-04F714479E2E}"/>
@@ -9657,7 +9657,7 @@
       </p:sp>
       <p:sp>
         <p:nvSpPr>
-          <p:cNvPr id="4" name="Slide Number Placeholder 3">
+          <p:cNvPr id="4" name="slide_number_footer_1">
             <a:extLst>
               <a:ext uri="{FF2B5EF4-FFF2-40B4-BE49-F238E27FC236}">
                 <a16:creationId xmlns:a16="http://schemas.microsoft.com/office/drawing/2014/main" id="{00E1BFDE-AF7A-27C2-8B42-1BF393B6FC64}"/>
@@ -9716,7 +9716,7 @@
       </p:grpSpPr>
       <p:sp>
         <p:nvSpPr>
-          <p:cNvPr id="2" name="Title 1">
+          <p:cNvPr id="2" name="title_top_1">
             <a:extLst>
               <a:ext uri="{FF2B5EF4-FFF2-40B4-BE49-F238E27FC236}">
                 <a16:creationId xmlns:a16="http://schemas.microsoft.com/office/drawing/2014/main" id="{78BE29A6-8C68-A0E7-DB00-1EC2C4A15E19}"/>
@@ -9753,7 +9753,7 @@
       </p:sp>
       <p:sp>
         <p:nvSpPr>
-          <p:cNvPr id="3" name="Content Placeholder 2">
+          <p:cNvPr id="3" name="content_1">
             <a:extLst>
               <a:ext uri="{FF2B5EF4-FFF2-40B4-BE49-F238E27FC236}">
                 <a16:creationId xmlns:a16="http://schemas.microsoft.com/office/drawing/2014/main" id="{EE9B037F-072D-604E-3087-C6AB2E273A79}"/>
@@ -9843,7 +9843,7 @@
       </p:sp>
       <p:sp>
         <p:nvSpPr>
-          <p:cNvPr id="4" name="Text Placeholder 3">
+          <p:cNvPr id="4" name="text_caption_1">
             <a:extLst>
               <a:ext uri="{FF2B5EF4-FFF2-40B4-BE49-F238E27FC236}">
                 <a16:creationId xmlns:a16="http://schemas.microsoft.com/office/drawing/2014/main" id="{7F2EF8C8-D6E6-30C3-71CB-BAB3D0ACBBCA}"/>
@@ -9914,7 +9914,7 @@
       </p:sp>
       <p:sp>
         <p:nvSpPr>
-          <p:cNvPr id="5" name="Date Placeholder 4">
+          <p:cNvPr id="5" name="date_footer_1">
             <a:extLst>
               <a:ext uri="{FF2B5EF4-FFF2-40B4-BE49-F238E27FC236}">
                 <a16:creationId xmlns:a16="http://schemas.microsoft.com/office/drawing/2014/main" id="{9A855646-1485-4EEF-2DC6-BA01D494EE58}"/>
@@ -9943,7 +9943,7 @@
       </p:sp>
       <p:sp>
         <p:nvSpPr>
-          <p:cNvPr id="6" name="Footer Placeholder 5">
+          <p:cNvPr id="6" name="footer_footer_1">
             <a:extLst>
               <a:ext uri="{FF2B5EF4-FFF2-40B4-BE49-F238E27FC236}">
                 <a16:creationId xmlns:a16="http://schemas.microsoft.com/office/drawing/2014/main" id="{C531B637-EAF5-C59B-4F74-92DEEA6EA007}"/>
@@ -9968,7 +9968,7 @@
       </p:sp>
       <p:sp>
         <p:nvSpPr>
-          <p:cNvPr id="7" name="Slide Number Placeholder 6">
+          <p:cNvPr id="7" name="slide_number_footer_1">
             <a:extLst>
               <a:ext uri="{FF2B5EF4-FFF2-40B4-BE49-F238E27FC236}">
                 <a16:creationId xmlns:a16="http://schemas.microsoft.com/office/drawing/2014/main" id="{B0B3D9EC-D2F8-9494-9FA1-70AE91FDA253}"/>
@@ -10027,7 +10027,7 @@
       </p:grpSpPr>
       <p:sp>
         <p:nvSpPr>
-          <p:cNvPr id="2" name="Title 1">
+          <p:cNvPr id="2" name="title_top_1">
             <a:extLst>
               <a:ext uri="{FF2B5EF4-FFF2-40B4-BE49-F238E27FC236}">
                 <a16:creationId xmlns:a16="http://schemas.microsoft.com/office/drawing/2014/main" id="{7D87E6D3-569E-0B7F-EEA9-88F852060802}"/>
@@ -10064,7 +10064,7 @@
       </p:sp>
       <p:sp>
         <p:nvSpPr>
-          <p:cNvPr id="3" name="Picture Placeholder 2">
+          <p:cNvPr id="3" name="image_1">
             <a:extLst>
               <a:ext uri="{FF2B5EF4-FFF2-40B4-BE49-F238E27FC236}">
                 <a16:creationId xmlns:a16="http://schemas.microsoft.com/office/drawing/2014/main" id="{626C9B64-94EB-4E47-3135-E27D435C37BE}"/>
@@ -10131,7 +10131,7 @@
       </p:sp>
       <p:sp>
         <p:nvSpPr>
-          <p:cNvPr id="4" name="Text Placeholder 3">
+          <p:cNvPr id="4" name="text_caption_1">
             <a:extLst>
               <a:ext uri="{FF2B5EF4-FFF2-40B4-BE49-F238E27FC236}">
                 <a16:creationId xmlns:a16="http://schemas.microsoft.com/office/drawing/2014/main" id="{EC045B9E-FD0B-2317-0A55-F4A0876CA926}"/>
@@ -10202,7 +10202,7 @@
       </p:sp>
       <p:sp>
         <p:nvSpPr>
-          <p:cNvPr id="5" name="Date Placeholder 4">
+          <p:cNvPr id="5" name="date_footer_1">
             <a:extLst>
               <a:ext uri="{FF2B5EF4-FFF2-40B4-BE49-F238E27FC236}">
                 <a16:creationId xmlns:a16="http://schemas.microsoft.com/office/drawing/2014/main" id="{880E2CA8-9924-8AF8-CE6F-D5EC88A5BEC3}"/>
@@ -10231,7 +10231,7 @@
       </p:sp>
       <p:sp>
         <p:nvSpPr>
-          <p:cNvPr id="6" name="Footer Placeholder 5">
+          <p:cNvPr id="6" name="footer_footer_1">
             <a:extLst>
               <a:ext uri="{FF2B5EF4-FFF2-40B4-BE49-F238E27FC236}">
                 <a16:creationId xmlns:a16="http://schemas.microsoft.com/office/drawing/2014/main" id="{5FB106BC-9E7F-B6A4-E169-055C3A5C1F5C}"/>
@@ -10256,7 +10256,7 @@
       </p:sp>
       <p:sp>
         <p:nvSpPr>
-          <p:cNvPr id="7" name="Slide Number Placeholder 6">
+          <p:cNvPr id="7" name="slide_number_footer_1">
             <a:extLst>
               <a:ext uri="{FF2B5EF4-FFF2-40B4-BE49-F238E27FC236}">
                 <a16:creationId xmlns:a16="http://schemas.microsoft.com/office/drawing/2014/main" id="{AA0BDA70-9B77-5C84-99B8-149EA1AC529C}"/>
@@ -10320,7 +10320,7 @@
       </p:grpSpPr>
       <p:sp>
         <p:nvSpPr>
-          <p:cNvPr id="2" name="Title 1">
+          <p:cNvPr id="2" name="title_top_1">
             <a:extLst>
               <a:ext uri="{FF2B5EF4-FFF2-40B4-BE49-F238E27FC236}">
                 <a16:creationId xmlns:a16="http://schemas.microsoft.com/office/drawing/2014/main" id="{B9B18E12-C90C-1B65-42E8-96CE8D34CFB5}"/>
@@ -10358,7 +10358,7 @@
       </p:sp>
       <p:sp>
         <p:nvSpPr>
-          <p:cNvPr id="3" name="Subtitle 2">
+          <p:cNvPr id="3" name="subtitle_1">
             <a:extLst>
               <a:ext uri="{FF2B5EF4-FFF2-40B4-BE49-F238E27FC236}">
                 <a16:creationId xmlns:a16="http://schemas.microsoft.com/office/drawing/2014/main" id="{6284AD76-518F-B369-C27A-4C1CF4113C27}"/>
@@ -10425,7 +10425,7 @@
       </p:sp>
       <p:sp>
         <p:nvSpPr>
-          <p:cNvPr id="4" name="Content Placeholder 3">
+          <p:cNvPr id="4" name="content_right_1">
             <a:extLst>
               <a:ext uri="{FF2B5EF4-FFF2-40B4-BE49-F238E27FC236}">
                 <a16:creationId xmlns:a16="http://schemas.microsoft.com/office/drawing/2014/main" id="{3D803EDE-61C6-1F86-7C27-588022D655B8}"/>
@@ -10472,7 +10472,7 @@
       </p:sp>
       <p:sp>
         <p:nvSpPr>
-          <p:cNvPr id="5" name="Text Placeholder 4">
+          <p:cNvPr id="5" name="title_right_1">
             <a:extLst>
               <a:ext uri="{FF2B5EF4-FFF2-40B4-BE49-F238E27FC236}">
                 <a16:creationId xmlns:a16="http://schemas.microsoft.com/office/drawing/2014/main" id="{FF26CE3E-92FC-B16A-B340-7F3D0216C2A9}"/>
@@ -10515,7 +10515,7 @@
       </p:sp>
       <p:sp>
         <p:nvSpPr>
-          <p:cNvPr id="6" name="Content Placeholder 5">
+          <p:cNvPr id="6" name="content_right_1">
             <a:extLst>
               <a:ext uri="{FF2B5EF4-FFF2-40B4-BE49-F238E27FC236}">
                 <a16:creationId xmlns:a16="http://schemas.microsoft.com/office/drawing/2014/main" id="{35EE3809-8DA6-2282-CDA5-EA09B7D8E466}"/>

</xml_diff>